<commit_message>
update métier dans Intégration V0.1. -ajout de la fonction setVariableName(String). Elle prend "a", "x" ou "x1" en paramètre. update de la présentation de génie logiciel.
</commit_message>
<xml_diff>
--- a/4. Cloture/Défense spec.pptx
+++ b/4. Cloture/Défense spec.pptx
@@ -6,10 +6,10 @@
     <p:sldMasterId id="2147483677" r:id="rId2"/>
   </p:sldMasterIdLst>
   <p:notesMasterIdLst>
-    <p:notesMasterId r:id="rId8"/>
+    <p:notesMasterId r:id="rId21"/>
   </p:notesMasterIdLst>
   <p:handoutMasterIdLst>
-    <p:handoutMasterId r:id="rId9"/>
+    <p:handoutMasterId r:id="rId22"/>
   </p:handoutMasterIdLst>
   <p:sldIdLst>
     <p:sldId id="256" r:id="rId3"/>
@@ -17,8 +17,21 @@
     <p:sldId id="260" r:id="rId5"/>
     <p:sldId id="261" r:id="rId6"/>
     <p:sldId id="262" r:id="rId7"/>
+    <p:sldId id="263" r:id="rId8"/>
+    <p:sldId id="264" r:id="rId9"/>
+    <p:sldId id="267" r:id="rId10"/>
+    <p:sldId id="266" r:id="rId11"/>
+    <p:sldId id="265" r:id="rId12"/>
+    <p:sldId id="268" r:id="rId13"/>
+    <p:sldId id="269" r:id="rId14"/>
+    <p:sldId id="270" r:id="rId15"/>
+    <p:sldId id="272" r:id="rId16"/>
+    <p:sldId id="274" r:id="rId17"/>
+    <p:sldId id="275" r:id="rId18"/>
+    <p:sldId id="276" r:id="rId19"/>
+    <p:sldId id="277" r:id="rId20"/>
   </p:sldIdLst>
-  <p:sldSz cx="12192000" cy="6858000"/>
+  <p:sldSz cx="9144000" cy="6858000" type="screen4x3"/>
   <p:notesSz cx="6858000" cy="9144000"/>
   <p:defaultTextStyle>
     <a:defPPr>
@@ -208,7 +221,7 @@
           <a:p>
             <a:fld id="{2AB2B15C-CED5-4376-841D-FD6A2CD08A5D}" type="datetimeFigureOut">
               <a:rPr lang="fr-CH" smtClean="0"/>
-              <a:t>03.06.2015</a:t>
+              <a:t>06.06.2015</a:t>
             </a:fld>
             <a:endParaRPr lang="fr-CH"/>
           </a:p>
@@ -374,7 +387,7 @@
           <a:p>
             <a:fld id="{95751C4D-42E3-44C2-8025-45DEF85D17C8}" type="datetimeFigureOut">
               <a:rPr lang="fr-CH" smtClean="0"/>
-              <a:t>03.06.2015</a:t>
+              <a:t>06.06.2015</a:t>
             </a:fld>
             <a:endParaRPr lang="fr-CH"/>
           </a:p>
@@ -392,8 +405,8 @@
         </p:nvSpPr>
         <p:spPr>
           <a:xfrm>
-            <a:off x="685800" y="1143000"/>
-            <a:ext cx="5486400" cy="3086100"/>
+            <a:off x="1371600" y="1143000"/>
+            <a:ext cx="4114800" cy="3086100"/>
           </a:xfrm>
           <a:prstGeom prst="rect">
             <a:avLst/>
@@ -672,8 +685,8 @@
         </p:nvSpPr>
         <p:spPr>
           <a:xfrm>
-            <a:off x="1524000" y="3101482"/>
-            <a:ext cx="9144000" cy="1162294"/>
+            <a:off x="1143000" y="3101482"/>
+            <a:ext cx="6858000" cy="1162294"/>
           </a:xfrm>
         </p:spPr>
         <p:txBody>
@@ -746,8 +759,8 @@
         </p:nvSpPr>
         <p:spPr>
           <a:xfrm>
-            <a:off x="360217" y="1910846"/>
-            <a:ext cx="11476183" cy="1089529"/>
+            <a:off x="270163" y="913651"/>
+            <a:ext cx="8607137" cy="2086725"/>
           </a:xfrm>
           <a:gradFill flip="none" rotWithShape="0">
             <a:gsLst>
@@ -935,7 +948,12 @@
             <p:ph type="sldNum" sz="quarter" idx="12"/>
           </p:nvPr>
         </p:nvSpPr>
-        <p:spPr/>
+        <p:spPr>
+          <a:xfrm>
+            <a:off x="7622341" y="6118792"/>
+            <a:ext cx="850540" cy="580000"/>
+          </a:xfrm>
+        </p:spPr>
         <p:txBody>
           <a:bodyPr/>
           <a:lstStyle/>
@@ -1033,8 +1051,8 @@
         </p:nvSpPr>
         <p:spPr>
           <a:xfrm>
-            <a:off x="1202920" y="1412111"/>
-            <a:ext cx="7072979" cy="4598271"/>
+            <a:off x="902190" y="1412111"/>
+            <a:ext cx="5304734" cy="4598271"/>
           </a:xfrm>
         </p:spPr>
         <p:txBody>
@@ -1102,8 +1120,8 @@
         </p:nvSpPr>
         <p:spPr>
           <a:xfrm>
-            <a:off x="8579464" y="1412110"/>
-            <a:ext cx="2407534" cy="4598272"/>
+            <a:off x="6274966" y="1412110"/>
+            <a:ext cx="1965284" cy="4598272"/>
           </a:xfrm>
           <a:prstGeom prst="rect">
             <a:avLst/>
@@ -1112,7 +1130,7 @@
         </p:spPr>
         <p:txBody>
           <a:bodyPr wrap="square" lIns="90000" rtlCol="0">
-            <a:normAutofit/>
+            <a:normAutofit fontScale="85000" lnSpcReduction="10000"/>
           </a:bodyPr>
           <a:lstStyle/>
           <a:p>
@@ -1209,7 +1227,12 @@
             <p:ph type="sldNum" sz="quarter" idx="10"/>
           </p:nvPr>
         </p:nvSpPr>
-        <p:spPr/>
+        <p:spPr>
+          <a:xfrm>
+            <a:off x="7622340" y="6118792"/>
+            <a:ext cx="808595" cy="580000"/>
+          </a:xfrm>
+        </p:spPr>
         <p:txBody>
           <a:bodyPr/>
           <a:lstStyle/>
@@ -1307,8 +1330,8 @@
         </p:nvSpPr>
         <p:spPr>
           <a:xfrm>
-            <a:off x="1202920" y="1412111"/>
-            <a:ext cx="7072979" cy="4598271"/>
+            <a:off x="902190" y="1412111"/>
+            <a:ext cx="5304734" cy="4598271"/>
           </a:xfrm>
         </p:spPr>
         <p:txBody>
@@ -1376,8 +1399,8 @@
         </p:nvSpPr>
         <p:spPr>
           <a:xfrm>
-            <a:off x="8579464" y="1412110"/>
-            <a:ext cx="2407534" cy="4598272"/>
+            <a:off x="6206923" y="1412110"/>
+            <a:ext cx="2173677" cy="4598272"/>
           </a:xfrm>
           <a:prstGeom prst="rect">
             <a:avLst/>
@@ -1386,7 +1409,7 @@
         </p:spPr>
         <p:txBody>
           <a:bodyPr wrap="square" lIns="90000" rtlCol="0">
-            <a:normAutofit/>
+            <a:normAutofit fontScale="92500"/>
           </a:bodyPr>
           <a:lstStyle/>
           <a:p>
@@ -1483,7 +1506,12 @@
             <p:ph type="sldNum" sz="quarter" idx="10"/>
           </p:nvPr>
         </p:nvSpPr>
-        <p:spPr/>
+        <p:spPr>
+          <a:xfrm>
+            <a:off x="7622340" y="6118792"/>
+            <a:ext cx="758261" cy="580000"/>
+          </a:xfrm>
+        </p:spPr>
         <p:txBody>
           <a:bodyPr/>
           <a:lstStyle/>
@@ -1581,8 +1609,8 @@
         </p:nvSpPr>
         <p:spPr>
           <a:xfrm>
-            <a:off x="1202920" y="1412111"/>
-            <a:ext cx="7072979" cy="4598271"/>
+            <a:off x="902190" y="1412111"/>
+            <a:ext cx="5304734" cy="4598271"/>
           </a:xfrm>
         </p:spPr>
         <p:txBody>
@@ -1650,8 +1678,8 @@
         </p:nvSpPr>
         <p:spPr>
           <a:xfrm>
-            <a:off x="8579464" y="1412110"/>
-            <a:ext cx="2407534" cy="4598272"/>
+            <a:off x="6283354" y="1412110"/>
+            <a:ext cx="1956895" cy="4598272"/>
           </a:xfrm>
           <a:prstGeom prst="rect">
             <a:avLst/>
@@ -1660,7 +1688,7 @@
         </p:spPr>
         <p:txBody>
           <a:bodyPr wrap="square" lIns="90000" rtlCol="0">
-            <a:normAutofit/>
+            <a:normAutofit fontScale="85000" lnSpcReduction="10000"/>
           </a:bodyPr>
           <a:lstStyle/>
           <a:p>
@@ -1757,7 +1785,12 @@
             <p:ph type="sldNum" sz="quarter" idx="10"/>
           </p:nvPr>
         </p:nvSpPr>
-        <p:spPr/>
+        <p:spPr>
+          <a:xfrm>
+            <a:off x="7622340" y="6118792"/>
+            <a:ext cx="758261" cy="580000"/>
+          </a:xfrm>
+        </p:spPr>
         <p:txBody>
           <a:bodyPr/>
           <a:lstStyle/>
@@ -1855,8 +1888,8 @@
         </p:nvSpPr>
         <p:spPr>
           <a:xfrm>
-            <a:off x="1202920" y="1412111"/>
-            <a:ext cx="7072979" cy="4598271"/>
+            <a:off x="902190" y="1412111"/>
+            <a:ext cx="5304734" cy="4598271"/>
           </a:xfrm>
         </p:spPr>
         <p:txBody>
@@ -1924,8 +1957,8 @@
         </p:nvSpPr>
         <p:spPr>
           <a:xfrm>
-            <a:off x="8579464" y="1412110"/>
-            <a:ext cx="2407534" cy="4598272"/>
+            <a:off x="6291744" y="1412110"/>
+            <a:ext cx="1948506" cy="4598272"/>
           </a:xfrm>
           <a:prstGeom prst="rect">
             <a:avLst/>
@@ -1934,7 +1967,7 @@
         </p:spPr>
         <p:txBody>
           <a:bodyPr wrap="square" lIns="90000" rtlCol="0">
-            <a:normAutofit/>
+            <a:normAutofit fontScale="85000" lnSpcReduction="10000"/>
           </a:bodyPr>
           <a:lstStyle/>
           <a:p>
@@ -2031,7 +2064,12 @@
             <p:ph type="sldNum" sz="quarter" idx="10"/>
           </p:nvPr>
         </p:nvSpPr>
-        <p:spPr/>
+        <p:spPr>
+          <a:xfrm>
+            <a:off x="7622340" y="6118792"/>
+            <a:ext cx="791817" cy="580000"/>
+          </a:xfrm>
+        </p:spPr>
         <p:txBody>
           <a:bodyPr/>
           <a:lstStyle/>
@@ -2135,8 +2173,8 @@
         </p:nvSpPr>
         <p:spPr>
           <a:xfrm>
-            <a:off x="1202919" y="284176"/>
-            <a:ext cx="9784080" cy="1012189"/>
+            <a:off x="902189" y="284177"/>
+            <a:ext cx="7338060" cy="1012189"/>
           </a:xfrm>
           <a:prstGeom prst="rect">
             <a:avLst/>
@@ -2168,8 +2206,8 @@
         </p:nvSpPr>
         <p:spPr>
           <a:xfrm>
-            <a:off x="1202919" y="1412112"/>
-            <a:ext cx="9784080" cy="3118792"/>
+            <a:off x="902189" y="1412112"/>
+            <a:ext cx="7338060" cy="3118792"/>
           </a:xfrm>
           <a:prstGeom prst="rect">
             <a:avLst/>
@@ -2241,8 +2279,8 @@
         </p:blipFill>
         <p:spPr bwMode="auto">
           <a:xfrm>
-            <a:off x="1524000" y="5209799"/>
-            <a:ext cx="2299949" cy="988979"/>
+            <a:off x="1143000" y="5209800"/>
+            <a:ext cx="1724962" cy="988979"/>
           </a:xfrm>
           <a:prstGeom prst="rect">
             <a:avLst/>
@@ -2278,8 +2316,8 @@
         </p:blipFill>
         <p:spPr bwMode="auto">
           <a:xfrm>
-            <a:off x="7565206" y="5418950"/>
-            <a:ext cx="3791462" cy="892844"/>
+            <a:off x="5673904" y="5418950"/>
+            <a:ext cx="2843597" cy="892844"/>
           </a:xfrm>
           <a:prstGeom prst="rect">
             <a:avLst/>
@@ -2653,7 +2691,7 @@
       </a:lvl9pPr>
     </p:otherStyle>
   </p:txStyles>
-  <p:extLst>
+  <p:extLst mod="1">
     <p:ext uri="{27BBF7A9-308A-43DC-89C8-2F10F3537804}">
       <p15:sldGuideLst xmlns:p15="http://schemas.microsoft.com/office/powerpoint/2012/main">
         <p15:guide id="1" orient="horz" pos="2160" userDrawn="1">
@@ -2661,7 +2699,7 @@
             <a:srgbClr val="F26B43"/>
           </p15:clr>
         </p15:guide>
-        <p15:guide id="2" pos="3840" userDrawn="1">
+        <p15:guide id="2" pos="2880" userDrawn="1">
           <p15:clr>
             <a:srgbClr val="F26B43"/>
           </p15:clr>
@@ -2730,8 +2768,8 @@
         </p:nvSpPr>
         <p:spPr>
           <a:xfrm>
-            <a:off x="1202919" y="680812"/>
-            <a:ext cx="9784080" cy="615553"/>
+            <a:off x="902189" y="680813"/>
+            <a:ext cx="7338060" cy="615553"/>
           </a:xfrm>
           <a:prstGeom prst="rect">
             <a:avLst/>
@@ -2787,8 +2825,8 @@
         </p:nvSpPr>
         <p:spPr>
           <a:xfrm>
-            <a:off x="1202919" y="1412111"/>
-            <a:ext cx="9784080" cy="4598271"/>
+            <a:off x="902189" y="1412111"/>
+            <a:ext cx="7338060" cy="4598271"/>
           </a:xfrm>
           <a:prstGeom prst="rect">
             <a:avLst/>
@@ -2849,8 +2887,8 @@
         </p:nvSpPr>
         <p:spPr>
           <a:xfrm>
-            <a:off x="10163121" y="6118792"/>
-            <a:ext cx="823877" cy="580000"/>
+            <a:off x="7622340" y="6118792"/>
+            <a:ext cx="858929" cy="580000"/>
           </a:xfrm>
           <a:prstGeom prst="rect">
             <a:avLst/>
@@ -2900,8 +2938,8 @@
         </p:blipFill>
         <p:spPr bwMode="auto">
           <a:xfrm>
-            <a:off x="1202919" y="6118792"/>
-            <a:ext cx="2462973" cy="580000"/>
+            <a:off x="902190" y="6118792"/>
+            <a:ext cx="1847230" cy="580000"/>
           </a:xfrm>
           <a:prstGeom prst="rect">
             <a:avLst/>
@@ -3282,12 +3320,12 @@
   <p:extLst mod="1">
     <p:ext uri="{27BBF7A9-308A-43DC-89C8-2F10F3537804}">
       <p15:sldGuideLst xmlns:p15="http://schemas.microsoft.com/office/powerpoint/2012/main">
-        <p15:guide id="1" orient="horz" pos="2160">
+        <p15:guide id="1" orient="horz" pos="2160" userDrawn="1">
           <p15:clr>
             <a:srgbClr val="F26B43"/>
           </p15:clr>
         </p15:guide>
-        <p15:guide id="2" pos="3840">
+        <p15:guide id="2" pos="2880" userDrawn="1">
           <p15:clr>
             <a:srgbClr val="F26B43"/>
           </p15:clr>
@@ -3354,7 +3392,12 @@
             <p:ph sz="quarter" idx="10"/>
           </p:nvPr>
         </p:nvSpPr>
-        <p:spPr/>
+        <p:spPr>
+          <a:xfrm>
+            <a:off x="270163" y="1910847"/>
+            <a:ext cx="8607137" cy="1089529"/>
+          </a:xfrm>
+        </p:spPr>
         <p:txBody>
           <a:bodyPr/>
           <a:lstStyle/>
@@ -3381,6 +3424,1249 @@
     <mc:Choice Requires="p14">
       <p:transition spd="slow" p14:dur="900">
         <p14:warp dir="in"/>
+      </p:transition>
+    </mc:Choice>
+    <mc:Fallback xmlns="">
+      <p:transition spd="slow">
+        <p:fade/>
+      </p:transition>
+    </mc:Fallback>
+  </mc:AlternateContent>
+  <p:timing>
+    <p:tnLst>
+      <p:par>
+        <p:cTn id="1" dur="indefinite" restart="never" nodeType="tmRoot"/>
+      </p:par>
+    </p:tnLst>
+  </p:timing>
+</p:sld>
+</file>
+
+<file path=ppt/slides/slide10.xml><?xml version="1.0" encoding="utf-8"?>
+<p:sld xmlns:a="http://schemas.openxmlformats.org/drawingml/2006/main" xmlns:r="http://schemas.openxmlformats.org/officeDocument/2006/relationships" xmlns:p="http://schemas.openxmlformats.org/presentationml/2006/main">
+  <p:cSld>
+    <p:spTree>
+      <p:nvGrpSpPr>
+        <p:cNvPr id="1" name=""/>
+        <p:cNvGrpSpPr/>
+        <p:nvPr/>
+      </p:nvGrpSpPr>
+      <p:grpSpPr>
+        <a:xfrm>
+          <a:off x="0" y="0"/>
+          <a:ext cx="0" cy="0"/>
+          <a:chOff x="0" y="0"/>
+          <a:chExt cx="0" cy="0"/>
+        </a:xfrm>
+      </p:grpSpPr>
+      <p:sp>
+        <p:nvSpPr>
+          <p:cNvPr id="5" name="Titre 4"/>
+          <p:cNvSpPr>
+            <a:spLocks noGrp="1"/>
+          </p:cNvSpPr>
+          <p:nvPr>
+            <p:ph type="title"/>
+          </p:nvPr>
+        </p:nvSpPr>
+        <p:spPr>
+          <a:xfrm>
+            <a:off x="902189" y="157593"/>
+            <a:ext cx="7338060" cy="1138773"/>
+          </a:xfrm>
+        </p:spPr>
+        <p:txBody>
+          <a:bodyPr/>
+          <a:lstStyle/>
+          <a:p>
+            <a:r>
+              <a:rPr lang="fr-CH" dirty="0" smtClean="0"/>
+              <a:t>Résoudre une équation</a:t>
+            </a:r>
+            <a:br>
+              <a:rPr lang="fr-CH" dirty="0" smtClean="0"/>
+            </a:br>
+            <a:r>
+              <a:rPr lang="fr-CH" dirty="0" smtClean="0"/>
+              <a:t>par étape</a:t>
+            </a:r>
+            <a:endParaRPr lang="fr-CH" dirty="0"/>
+          </a:p>
+        </p:txBody>
+      </p:sp>
+      <p:sp>
+        <p:nvSpPr>
+          <p:cNvPr id="4" name="Espace réservé du numéro de diapositive 3"/>
+          <p:cNvSpPr>
+            <a:spLocks noGrp="1"/>
+          </p:cNvSpPr>
+          <p:nvPr>
+            <p:ph type="sldNum" sz="quarter" idx="10"/>
+          </p:nvPr>
+        </p:nvSpPr>
+        <p:spPr/>
+        <p:txBody>
+          <a:bodyPr/>
+          <a:lstStyle/>
+          <a:p>
+            <a:fld id="{C214D402-94C6-4E56-8BC2-0A53FF3B7787}" type="slidenum">
+              <a:rPr lang="fr-CH" smtClean="0"/>
+              <a:pPr/>
+              <a:t>9</a:t>
+            </a:fld>
+            <a:endParaRPr lang="fr-CH" dirty="0"/>
+          </a:p>
+        </p:txBody>
+      </p:sp>
+      <p:pic>
+        <p:nvPicPr>
+          <p:cNvPr id="7" name="Espace réservé du contenu 5"/>
+          <p:cNvPicPr>
+            <a:picLocks noGrp="1" noChangeAspect="1"/>
+          </p:cNvPicPr>
+          <p:nvPr>
+            <p:ph idx="1"/>
+          </p:nvPr>
+        </p:nvPicPr>
+        <p:blipFill>
+          <a:blip r:embed="rId2">
+            <a:extLst>
+              <a:ext uri="{28A0092B-C50C-407E-A947-70E740481C1C}">
+                <a14:useLocalDpi xmlns:a14="http://schemas.microsoft.com/office/drawing/2010/main" val="0"/>
+              </a:ext>
+            </a:extLst>
+          </a:blip>
+          <a:stretch>
+            <a:fillRect/>
+          </a:stretch>
+        </p:blipFill>
+        <p:spPr>
+          <a:xfrm>
+            <a:off x="637707" y="1502233"/>
+            <a:ext cx="5658640" cy="4410691"/>
+          </a:xfrm>
+        </p:spPr>
+      </p:pic>
+      <p:sp>
+        <p:nvSpPr>
+          <p:cNvPr id="8" name="Ellipse 7"/>
+          <p:cNvSpPr/>
+          <p:nvPr/>
+        </p:nvSpPr>
+        <p:spPr>
+          <a:xfrm>
+            <a:off x="4110361" y="4030462"/>
+            <a:ext cx="1260629" cy="568171"/>
+          </a:xfrm>
+          <a:prstGeom prst="ellipse">
+            <a:avLst/>
+          </a:prstGeom>
+          <a:noFill/>
+          <a:ln w="57150">
+            <a:solidFill>
+              <a:srgbClr val="FF0000"/>
+            </a:solidFill>
+          </a:ln>
+        </p:spPr>
+        <p:style>
+          <a:lnRef idx="2">
+            <a:schemeClr val="accent1">
+              <a:shade val="50000"/>
+            </a:schemeClr>
+          </a:lnRef>
+          <a:fillRef idx="1">
+            <a:schemeClr val="accent1"/>
+          </a:fillRef>
+          <a:effectRef idx="0">
+            <a:schemeClr val="accent1"/>
+          </a:effectRef>
+          <a:fontRef idx="minor">
+            <a:schemeClr val="lt1"/>
+          </a:fontRef>
+        </p:style>
+        <p:txBody>
+          <a:bodyPr rtlCol="0" anchor="ctr"/>
+          <a:lstStyle/>
+          <a:p>
+            <a:pPr algn="ctr"/>
+            <a:endParaRPr lang="fr-CH"/>
+          </a:p>
+        </p:txBody>
+      </p:sp>
+    </p:spTree>
+    <p:extLst>
+      <p:ext uri="{BB962C8B-B14F-4D97-AF65-F5344CB8AC3E}">
+        <p14:creationId xmlns:p14="http://schemas.microsoft.com/office/powerpoint/2010/main" val="280198458"/>
+      </p:ext>
+    </p:extLst>
+  </p:cSld>
+  <p:clrMapOvr>
+    <a:masterClrMapping/>
+  </p:clrMapOvr>
+  <mc:AlternateContent xmlns:mc="http://schemas.openxmlformats.org/markup-compatibility/2006" xmlns:p14="http://schemas.microsoft.com/office/powerpoint/2010/main">
+    <mc:Choice Requires="p14">
+      <p:transition spd="slow" p14:dur="800">
+        <p14:flythrough/>
+      </p:transition>
+    </mc:Choice>
+    <mc:Fallback xmlns="">
+      <p:transition spd="slow">
+        <p:fade/>
+      </p:transition>
+    </mc:Fallback>
+  </mc:AlternateContent>
+  <p:timing>
+    <p:tnLst>
+      <p:par>
+        <p:cTn id="1" dur="indefinite" restart="never" nodeType="tmRoot"/>
+      </p:par>
+    </p:tnLst>
+  </p:timing>
+</p:sld>
+</file>
+
+<file path=ppt/slides/slide11.xml><?xml version="1.0" encoding="utf-8"?>
+<p:sld xmlns:a="http://schemas.openxmlformats.org/drawingml/2006/main" xmlns:r="http://schemas.openxmlformats.org/officeDocument/2006/relationships" xmlns:p="http://schemas.openxmlformats.org/presentationml/2006/main">
+  <p:cSld>
+    <p:spTree>
+      <p:nvGrpSpPr>
+        <p:cNvPr id="1" name=""/>
+        <p:cNvGrpSpPr/>
+        <p:nvPr/>
+      </p:nvGrpSpPr>
+      <p:grpSpPr>
+        <a:xfrm>
+          <a:off x="0" y="0"/>
+          <a:ext cx="0" cy="0"/>
+          <a:chOff x="0" y="0"/>
+          <a:chExt cx="0" cy="0"/>
+        </a:xfrm>
+      </p:grpSpPr>
+      <p:sp>
+        <p:nvSpPr>
+          <p:cNvPr id="2" name="Titre 1"/>
+          <p:cNvSpPr>
+            <a:spLocks noGrp="1"/>
+          </p:cNvSpPr>
+          <p:nvPr>
+            <p:ph type="title"/>
+          </p:nvPr>
+        </p:nvSpPr>
+        <p:spPr>
+          <a:xfrm>
+            <a:off x="522989" y="492740"/>
+            <a:ext cx="8096433" cy="537070"/>
+          </a:xfrm>
+        </p:spPr>
+        <p:txBody>
+          <a:bodyPr/>
+          <a:lstStyle/>
+          <a:p>
+            <a:r>
+              <a:rPr lang="fr-CH" sz="3400" dirty="0" smtClean="0"/>
+              <a:t>Diagramme de séquence système</a:t>
+            </a:r>
+            <a:endParaRPr lang="fr-CH" sz="3400" dirty="0"/>
+          </a:p>
+        </p:txBody>
+      </p:sp>
+      <p:pic>
+        <p:nvPicPr>
+          <p:cNvPr id="5" name="Espace réservé du contenu 4"/>
+          <p:cNvPicPr>
+            <a:picLocks noGrp="1" noChangeAspect="1"/>
+          </p:cNvPicPr>
+          <p:nvPr>
+            <p:ph idx="1"/>
+          </p:nvPr>
+        </p:nvPicPr>
+        <p:blipFill>
+          <a:blip r:embed="rId2">
+            <a:extLst>
+              <a:ext uri="{28A0092B-C50C-407E-A947-70E740481C1C}">
+                <a14:useLocalDpi xmlns:a14="http://schemas.microsoft.com/office/drawing/2010/main" val="0"/>
+              </a:ext>
+            </a:extLst>
+          </a:blip>
+          <a:stretch>
+            <a:fillRect/>
+          </a:stretch>
+        </p:blipFill>
+        <p:spPr>
+          <a:xfrm>
+            <a:off x="522989" y="1080410"/>
+            <a:ext cx="7949892" cy="4987782"/>
+          </a:xfrm>
+        </p:spPr>
+      </p:pic>
+      <p:sp>
+        <p:nvSpPr>
+          <p:cNvPr id="4" name="Espace réservé du numéro de diapositive 3"/>
+          <p:cNvSpPr>
+            <a:spLocks noGrp="1"/>
+          </p:cNvSpPr>
+          <p:nvPr>
+            <p:ph type="sldNum" sz="quarter" idx="12"/>
+          </p:nvPr>
+        </p:nvSpPr>
+        <p:spPr/>
+        <p:txBody>
+          <a:bodyPr/>
+          <a:lstStyle/>
+          <a:p>
+            <a:fld id="{C214D402-94C6-4E56-8BC2-0A53FF3B7787}" type="slidenum">
+              <a:rPr lang="fr-CH" smtClean="0"/>
+              <a:pPr/>
+              <a:t>10</a:t>
+            </a:fld>
+            <a:endParaRPr lang="fr-CH" dirty="0"/>
+          </a:p>
+        </p:txBody>
+      </p:sp>
+    </p:spTree>
+    <p:extLst>
+      <p:ext uri="{BB962C8B-B14F-4D97-AF65-F5344CB8AC3E}">
+        <p14:creationId xmlns:p14="http://schemas.microsoft.com/office/powerpoint/2010/main" val="3275669873"/>
+      </p:ext>
+    </p:extLst>
+  </p:cSld>
+  <p:clrMapOvr>
+    <a:masterClrMapping/>
+  </p:clrMapOvr>
+  <mc:AlternateContent xmlns:mc="http://schemas.openxmlformats.org/markup-compatibility/2006" xmlns:p14="http://schemas.microsoft.com/office/powerpoint/2010/main">
+    <mc:Choice Requires="p14">
+      <p:transition spd="slow" p14:dur="800">
+        <p14:flythrough/>
+      </p:transition>
+    </mc:Choice>
+    <mc:Fallback xmlns="">
+      <p:transition spd="slow">
+        <p:fade/>
+      </p:transition>
+    </mc:Fallback>
+  </mc:AlternateContent>
+  <p:timing>
+    <p:tnLst>
+      <p:par>
+        <p:cTn id="1" dur="indefinite" restart="never" nodeType="tmRoot"/>
+      </p:par>
+    </p:tnLst>
+  </p:timing>
+</p:sld>
+</file>
+
+<file path=ppt/slides/slide12.xml><?xml version="1.0" encoding="utf-8"?>
+<p:sld xmlns:a="http://schemas.openxmlformats.org/drawingml/2006/main" xmlns:r="http://schemas.openxmlformats.org/officeDocument/2006/relationships" xmlns:p="http://schemas.openxmlformats.org/presentationml/2006/main">
+  <p:cSld>
+    <p:spTree>
+      <p:nvGrpSpPr>
+        <p:cNvPr id="1" name=""/>
+        <p:cNvGrpSpPr/>
+        <p:nvPr/>
+      </p:nvGrpSpPr>
+      <p:grpSpPr>
+        <a:xfrm>
+          <a:off x="0" y="0"/>
+          <a:ext cx="0" cy="0"/>
+          <a:chOff x="0" y="0"/>
+          <a:chExt cx="0" cy="0"/>
+        </a:xfrm>
+      </p:grpSpPr>
+      <p:sp>
+        <p:nvSpPr>
+          <p:cNvPr id="6" name="Titre 5"/>
+          <p:cNvSpPr>
+            <a:spLocks noGrp="1"/>
+          </p:cNvSpPr>
+          <p:nvPr>
+            <p:ph type="title"/>
+          </p:nvPr>
+        </p:nvSpPr>
+        <p:spPr>
+          <a:xfrm>
+            <a:off x="901700" y="165586"/>
+            <a:ext cx="7570228" cy="890858"/>
+          </a:xfrm>
+        </p:spPr>
+        <p:txBody>
+          <a:bodyPr/>
+          <a:lstStyle/>
+          <a:p>
+            <a:r>
+              <a:rPr lang="fr-CH" dirty="0" smtClean="0"/>
+              <a:t>Diagramme de communication</a:t>
+            </a:r>
+            <a:endParaRPr lang="fr-CH" dirty="0"/>
+          </a:p>
+        </p:txBody>
+      </p:sp>
+      <p:pic>
+        <p:nvPicPr>
+          <p:cNvPr id="5" name="Espace réservé du contenu 4"/>
+          <p:cNvPicPr>
+            <a:picLocks noGrp="1" noChangeAspect="1"/>
+          </p:cNvPicPr>
+          <p:nvPr>
+            <p:ph idx="1"/>
+          </p:nvPr>
+        </p:nvPicPr>
+        <p:blipFill>
+          <a:blip r:embed="rId2">
+            <a:extLst>
+              <a:ext uri="{28A0092B-C50C-407E-A947-70E740481C1C}">
+                <a14:useLocalDpi xmlns:a14="http://schemas.microsoft.com/office/drawing/2010/main" val="0"/>
+              </a:ext>
+            </a:extLst>
+          </a:blip>
+          <a:stretch>
+            <a:fillRect/>
+          </a:stretch>
+        </p:blipFill>
+        <p:spPr>
+          <a:xfrm>
+            <a:off x="0" y="1398693"/>
+            <a:ext cx="9144000" cy="4524599"/>
+          </a:xfrm>
+        </p:spPr>
+      </p:pic>
+      <p:sp>
+        <p:nvSpPr>
+          <p:cNvPr id="4" name="Espace réservé du numéro de diapositive 3"/>
+          <p:cNvSpPr>
+            <a:spLocks noGrp="1"/>
+          </p:cNvSpPr>
+          <p:nvPr>
+            <p:ph type="sldNum" sz="quarter" idx="12"/>
+          </p:nvPr>
+        </p:nvSpPr>
+        <p:spPr/>
+        <p:txBody>
+          <a:bodyPr/>
+          <a:lstStyle/>
+          <a:p>
+            <a:fld id="{C214D402-94C6-4E56-8BC2-0A53FF3B7787}" type="slidenum">
+              <a:rPr lang="fr-CH" smtClean="0"/>
+              <a:pPr/>
+              <a:t>11</a:t>
+            </a:fld>
+            <a:endParaRPr lang="fr-CH" dirty="0"/>
+          </a:p>
+        </p:txBody>
+      </p:sp>
+    </p:spTree>
+    <p:extLst>
+      <p:ext uri="{BB962C8B-B14F-4D97-AF65-F5344CB8AC3E}">
+        <p14:creationId xmlns:p14="http://schemas.microsoft.com/office/powerpoint/2010/main" val="870265293"/>
+      </p:ext>
+    </p:extLst>
+  </p:cSld>
+  <p:clrMapOvr>
+    <a:masterClrMapping/>
+  </p:clrMapOvr>
+  <mc:AlternateContent xmlns:mc="http://schemas.openxmlformats.org/markup-compatibility/2006" xmlns:p14="http://schemas.microsoft.com/office/powerpoint/2010/main">
+    <mc:Choice Requires="p14">
+      <p:transition spd="slow" p14:dur="800">
+        <p14:flythrough/>
+      </p:transition>
+    </mc:Choice>
+    <mc:Fallback xmlns="">
+      <p:transition spd="slow">
+        <p:fade/>
+      </p:transition>
+    </mc:Fallback>
+  </mc:AlternateContent>
+  <p:timing>
+    <p:tnLst>
+      <p:par>
+        <p:cTn id="1" dur="indefinite" restart="never" nodeType="tmRoot"/>
+      </p:par>
+    </p:tnLst>
+  </p:timing>
+</p:sld>
+</file>
+
+<file path=ppt/slides/slide13.xml><?xml version="1.0" encoding="utf-8"?>
+<p:sld xmlns:a="http://schemas.openxmlformats.org/drawingml/2006/main" xmlns:r="http://schemas.openxmlformats.org/officeDocument/2006/relationships" xmlns:p="http://schemas.openxmlformats.org/presentationml/2006/main">
+  <p:cSld>
+    <p:spTree>
+      <p:nvGrpSpPr>
+        <p:cNvPr id="1" name=""/>
+        <p:cNvGrpSpPr/>
+        <p:nvPr/>
+      </p:nvGrpSpPr>
+      <p:grpSpPr>
+        <a:xfrm>
+          <a:off x="0" y="0"/>
+          <a:ext cx="0" cy="0"/>
+          <a:chOff x="0" y="0"/>
+          <a:chExt cx="0" cy="0"/>
+        </a:xfrm>
+      </p:grpSpPr>
+      <p:sp>
+        <p:nvSpPr>
+          <p:cNvPr id="2" name="Titre 1"/>
+          <p:cNvSpPr>
+            <a:spLocks noGrp="1"/>
+          </p:cNvSpPr>
+          <p:nvPr>
+            <p:ph type="title"/>
+          </p:nvPr>
+        </p:nvSpPr>
+        <p:spPr>
+          <a:xfrm>
+            <a:off x="671369" y="352340"/>
+            <a:ext cx="7966603" cy="615553"/>
+          </a:xfrm>
+        </p:spPr>
+        <p:txBody>
+          <a:bodyPr/>
+          <a:lstStyle/>
+          <a:p>
+            <a:r>
+              <a:rPr lang="fr-CH" dirty="0" smtClean="0"/>
+              <a:t>Diagramme de séquence détaillé</a:t>
+            </a:r>
+            <a:endParaRPr lang="fr-CH" dirty="0"/>
+          </a:p>
+        </p:txBody>
+      </p:sp>
+      <p:pic>
+        <p:nvPicPr>
+          <p:cNvPr id="5" name="Espace réservé du contenu 4"/>
+          <p:cNvPicPr>
+            <a:picLocks noGrp="1" noChangeAspect="1"/>
+          </p:cNvPicPr>
+          <p:nvPr>
+            <p:ph idx="1"/>
+          </p:nvPr>
+        </p:nvPicPr>
+        <p:blipFill>
+          <a:blip r:embed="rId2">
+            <a:extLst>
+              <a:ext uri="{28A0092B-C50C-407E-A947-70E740481C1C}">
+                <a14:useLocalDpi xmlns:a14="http://schemas.microsoft.com/office/drawing/2010/main" val="0"/>
+              </a:ext>
+            </a:extLst>
+          </a:blip>
+          <a:stretch>
+            <a:fillRect/>
+          </a:stretch>
+        </p:blipFill>
+        <p:spPr>
+          <a:xfrm>
+            <a:off x="2910" y="1325576"/>
+            <a:ext cx="9141090" cy="4285111"/>
+          </a:xfrm>
+        </p:spPr>
+      </p:pic>
+      <p:sp>
+        <p:nvSpPr>
+          <p:cNvPr id="4" name="Espace réservé du numéro de diapositive 3"/>
+          <p:cNvSpPr>
+            <a:spLocks noGrp="1"/>
+          </p:cNvSpPr>
+          <p:nvPr>
+            <p:ph type="sldNum" sz="quarter" idx="12"/>
+          </p:nvPr>
+        </p:nvSpPr>
+        <p:spPr/>
+        <p:txBody>
+          <a:bodyPr/>
+          <a:lstStyle/>
+          <a:p>
+            <a:fld id="{C214D402-94C6-4E56-8BC2-0A53FF3B7787}" type="slidenum">
+              <a:rPr lang="fr-CH" smtClean="0"/>
+              <a:pPr/>
+              <a:t>12</a:t>
+            </a:fld>
+            <a:endParaRPr lang="fr-CH" dirty="0"/>
+          </a:p>
+        </p:txBody>
+      </p:sp>
+    </p:spTree>
+    <p:extLst>
+      <p:ext uri="{BB962C8B-B14F-4D97-AF65-F5344CB8AC3E}">
+        <p14:creationId xmlns:p14="http://schemas.microsoft.com/office/powerpoint/2010/main" val="2320882461"/>
+      </p:ext>
+    </p:extLst>
+  </p:cSld>
+  <p:clrMapOvr>
+    <a:masterClrMapping/>
+  </p:clrMapOvr>
+  <mc:AlternateContent xmlns:mc="http://schemas.openxmlformats.org/markup-compatibility/2006" xmlns:p14="http://schemas.microsoft.com/office/powerpoint/2010/main">
+    <mc:Choice Requires="p14">
+      <p:transition spd="slow" p14:dur="800">
+        <p14:flythrough/>
+      </p:transition>
+    </mc:Choice>
+    <mc:Fallback xmlns="">
+      <p:transition spd="slow">
+        <p:fade/>
+      </p:transition>
+    </mc:Fallback>
+  </mc:AlternateContent>
+  <p:timing>
+    <p:tnLst>
+      <p:par>
+        <p:cTn id="1" dur="indefinite" restart="never" nodeType="tmRoot"/>
+      </p:par>
+    </p:tnLst>
+  </p:timing>
+</p:sld>
+</file>
+
+<file path=ppt/slides/slide14.xml><?xml version="1.0" encoding="utf-8"?>
+<p:sld xmlns:a="http://schemas.openxmlformats.org/drawingml/2006/main" xmlns:r="http://schemas.openxmlformats.org/officeDocument/2006/relationships" xmlns:p="http://schemas.openxmlformats.org/presentationml/2006/main">
+  <p:cSld>
+    <p:spTree>
+      <p:nvGrpSpPr>
+        <p:cNvPr id="1" name=""/>
+        <p:cNvGrpSpPr/>
+        <p:nvPr/>
+      </p:nvGrpSpPr>
+      <p:grpSpPr>
+        <a:xfrm>
+          <a:off x="0" y="0"/>
+          <a:ext cx="0" cy="0"/>
+          <a:chOff x="0" y="0"/>
+          <a:chExt cx="0" cy="0"/>
+        </a:xfrm>
+      </p:grpSpPr>
+      <p:sp>
+        <p:nvSpPr>
+          <p:cNvPr id="5" name="Titre 4"/>
+          <p:cNvSpPr>
+            <a:spLocks noGrp="1"/>
+          </p:cNvSpPr>
+          <p:nvPr>
+            <p:ph type="title"/>
+          </p:nvPr>
+        </p:nvSpPr>
+        <p:spPr>
+          <a:xfrm>
+            <a:off x="902189" y="680813"/>
+            <a:ext cx="7338060" cy="615553"/>
+          </a:xfrm>
+        </p:spPr>
+        <p:txBody>
+          <a:bodyPr/>
+          <a:lstStyle/>
+          <a:p>
+            <a:r>
+              <a:rPr lang="fr-CH" dirty="0"/>
+              <a:t>Sauvegarder </a:t>
+            </a:r>
+            <a:r>
+              <a:rPr lang="fr-CH" dirty="0" smtClean="0"/>
+              <a:t>un problème</a:t>
+            </a:r>
+            <a:endParaRPr lang="fr-CH" dirty="0"/>
+          </a:p>
+        </p:txBody>
+      </p:sp>
+      <p:sp>
+        <p:nvSpPr>
+          <p:cNvPr id="4" name="Espace réservé du numéro de diapositive 3"/>
+          <p:cNvSpPr>
+            <a:spLocks noGrp="1"/>
+          </p:cNvSpPr>
+          <p:nvPr>
+            <p:ph type="sldNum" sz="quarter" idx="10"/>
+          </p:nvPr>
+        </p:nvSpPr>
+        <p:spPr/>
+        <p:txBody>
+          <a:bodyPr/>
+          <a:lstStyle/>
+          <a:p>
+            <a:fld id="{C214D402-94C6-4E56-8BC2-0A53FF3B7787}" type="slidenum">
+              <a:rPr lang="fr-CH" smtClean="0"/>
+              <a:pPr/>
+              <a:t>13</a:t>
+            </a:fld>
+            <a:endParaRPr lang="fr-CH" dirty="0"/>
+          </a:p>
+        </p:txBody>
+      </p:sp>
+      <p:pic>
+        <p:nvPicPr>
+          <p:cNvPr id="7" name="Espace réservé du contenu 5"/>
+          <p:cNvPicPr>
+            <a:picLocks noGrp="1" noChangeAspect="1"/>
+          </p:cNvPicPr>
+          <p:nvPr>
+            <p:ph idx="1"/>
+          </p:nvPr>
+        </p:nvPicPr>
+        <p:blipFill>
+          <a:blip r:embed="rId2">
+            <a:extLst>
+              <a:ext uri="{28A0092B-C50C-407E-A947-70E740481C1C}">
+                <a14:useLocalDpi xmlns:a14="http://schemas.microsoft.com/office/drawing/2010/main" val="0"/>
+              </a:ext>
+            </a:extLst>
+          </a:blip>
+          <a:stretch>
+            <a:fillRect/>
+          </a:stretch>
+        </p:blipFill>
+        <p:spPr>
+          <a:xfrm>
+            <a:off x="637707" y="1502233"/>
+            <a:ext cx="5658640" cy="4410691"/>
+          </a:xfrm>
+        </p:spPr>
+      </p:pic>
+      <p:sp>
+        <p:nvSpPr>
+          <p:cNvPr id="8" name="Ellipse 7"/>
+          <p:cNvSpPr/>
+          <p:nvPr/>
+        </p:nvSpPr>
+        <p:spPr>
+          <a:xfrm>
+            <a:off x="2130641" y="3932808"/>
+            <a:ext cx="1313895" cy="568171"/>
+          </a:xfrm>
+          <a:prstGeom prst="ellipse">
+            <a:avLst/>
+          </a:prstGeom>
+          <a:noFill/>
+          <a:ln w="57150">
+            <a:solidFill>
+              <a:srgbClr val="FF0000"/>
+            </a:solidFill>
+          </a:ln>
+        </p:spPr>
+        <p:style>
+          <a:lnRef idx="2">
+            <a:schemeClr val="accent1">
+              <a:shade val="50000"/>
+            </a:schemeClr>
+          </a:lnRef>
+          <a:fillRef idx="1">
+            <a:schemeClr val="accent1"/>
+          </a:fillRef>
+          <a:effectRef idx="0">
+            <a:schemeClr val="accent1"/>
+          </a:effectRef>
+          <a:fontRef idx="minor">
+            <a:schemeClr val="lt1"/>
+          </a:fontRef>
+        </p:style>
+        <p:txBody>
+          <a:bodyPr rtlCol="0" anchor="ctr"/>
+          <a:lstStyle/>
+          <a:p>
+            <a:pPr algn="ctr"/>
+            <a:endParaRPr lang="fr-CH"/>
+          </a:p>
+        </p:txBody>
+      </p:sp>
+    </p:spTree>
+    <p:extLst>
+      <p:ext uri="{BB962C8B-B14F-4D97-AF65-F5344CB8AC3E}">
+        <p14:creationId xmlns:p14="http://schemas.microsoft.com/office/powerpoint/2010/main" val="2298193753"/>
+      </p:ext>
+    </p:extLst>
+  </p:cSld>
+  <p:clrMapOvr>
+    <a:masterClrMapping/>
+  </p:clrMapOvr>
+  <mc:AlternateContent xmlns:mc="http://schemas.openxmlformats.org/markup-compatibility/2006" xmlns:p14="http://schemas.microsoft.com/office/powerpoint/2010/main">
+    <mc:Choice Requires="p14">
+      <p:transition spd="slow" p14:dur="800">
+        <p14:flythrough/>
+      </p:transition>
+    </mc:Choice>
+    <mc:Fallback xmlns="">
+      <p:transition spd="slow">
+        <p:fade/>
+      </p:transition>
+    </mc:Fallback>
+  </mc:AlternateContent>
+  <p:timing>
+    <p:tnLst>
+      <p:par>
+        <p:cTn id="1" dur="indefinite" restart="never" nodeType="tmRoot"/>
+      </p:par>
+    </p:tnLst>
+  </p:timing>
+</p:sld>
+</file>
+
+<file path=ppt/slides/slide15.xml><?xml version="1.0" encoding="utf-8"?>
+<p:sld xmlns:a="http://schemas.openxmlformats.org/drawingml/2006/main" xmlns:r="http://schemas.openxmlformats.org/officeDocument/2006/relationships" xmlns:p="http://schemas.openxmlformats.org/presentationml/2006/main">
+  <p:cSld>
+    <p:spTree>
+      <p:nvGrpSpPr>
+        <p:cNvPr id="1" name=""/>
+        <p:cNvGrpSpPr/>
+        <p:nvPr/>
+      </p:nvGrpSpPr>
+      <p:grpSpPr>
+        <a:xfrm>
+          <a:off x="0" y="0"/>
+          <a:ext cx="0" cy="0"/>
+          <a:chOff x="0" y="0"/>
+          <a:chExt cx="0" cy="0"/>
+        </a:xfrm>
+      </p:grpSpPr>
+      <p:sp>
+        <p:nvSpPr>
+          <p:cNvPr id="2" name="Titre 1"/>
+          <p:cNvSpPr>
+            <a:spLocks noGrp="1"/>
+          </p:cNvSpPr>
+          <p:nvPr>
+            <p:ph type="title"/>
+          </p:nvPr>
+        </p:nvSpPr>
+        <p:spPr>
+          <a:xfrm>
+            <a:off x="522989" y="492740"/>
+            <a:ext cx="8096433" cy="537070"/>
+          </a:xfrm>
+        </p:spPr>
+        <p:txBody>
+          <a:bodyPr/>
+          <a:lstStyle/>
+          <a:p>
+            <a:r>
+              <a:rPr lang="fr-CH" sz="3400" dirty="0" smtClean="0"/>
+              <a:t>Diagramme de séquence système</a:t>
+            </a:r>
+            <a:endParaRPr lang="fr-CH" sz="3400" dirty="0"/>
+          </a:p>
+        </p:txBody>
+      </p:sp>
+      <p:sp>
+        <p:nvSpPr>
+          <p:cNvPr id="4" name="Espace réservé du numéro de diapositive 3"/>
+          <p:cNvSpPr>
+            <a:spLocks noGrp="1"/>
+          </p:cNvSpPr>
+          <p:nvPr>
+            <p:ph type="sldNum" sz="quarter" idx="12"/>
+          </p:nvPr>
+        </p:nvSpPr>
+        <p:spPr/>
+        <p:txBody>
+          <a:bodyPr/>
+          <a:lstStyle/>
+          <a:p>
+            <a:fld id="{C214D402-94C6-4E56-8BC2-0A53FF3B7787}" type="slidenum">
+              <a:rPr lang="fr-CH" smtClean="0"/>
+              <a:pPr/>
+              <a:t>14</a:t>
+            </a:fld>
+            <a:endParaRPr lang="fr-CH" dirty="0"/>
+          </a:p>
+        </p:txBody>
+      </p:sp>
+      <p:pic>
+        <p:nvPicPr>
+          <p:cNvPr id="6" name="Espace réservé du contenu 5"/>
+          <p:cNvPicPr>
+            <a:picLocks noGrp="1" noChangeAspect="1"/>
+          </p:cNvPicPr>
+          <p:nvPr>
+            <p:ph idx="1"/>
+          </p:nvPr>
+        </p:nvPicPr>
+        <p:blipFill>
+          <a:blip r:embed="rId2">
+            <a:extLst>
+              <a:ext uri="{28A0092B-C50C-407E-A947-70E740481C1C}">
+                <a14:useLocalDpi xmlns:a14="http://schemas.microsoft.com/office/drawing/2010/main" val="0"/>
+              </a:ext>
+            </a:extLst>
+          </a:blip>
+          <a:stretch>
+            <a:fillRect/>
+          </a:stretch>
+        </p:blipFill>
+        <p:spPr>
+          <a:xfrm>
+            <a:off x="612560" y="1102155"/>
+            <a:ext cx="7860322" cy="4670283"/>
+          </a:xfrm>
+        </p:spPr>
+      </p:pic>
+    </p:spTree>
+    <p:extLst>
+      <p:ext uri="{BB962C8B-B14F-4D97-AF65-F5344CB8AC3E}">
+        <p14:creationId xmlns:p14="http://schemas.microsoft.com/office/powerpoint/2010/main" val="2731783113"/>
+      </p:ext>
+    </p:extLst>
+  </p:cSld>
+  <p:clrMapOvr>
+    <a:masterClrMapping/>
+  </p:clrMapOvr>
+  <mc:AlternateContent xmlns:mc="http://schemas.openxmlformats.org/markup-compatibility/2006" xmlns:p14="http://schemas.microsoft.com/office/powerpoint/2010/main">
+    <mc:Choice Requires="p14">
+      <p:transition spd="slow" p14:dur="800">
+        <p14:flythrough/>
+      </p:transition>
+    </mc:Choice>
+    <mc:Fallback xmlns="">
+      <p:transition spd="slow">
+        <p:fade/>
+      </p:transition>
+    </mc:Fallback>
+  </mc:AlternateContent>
+  <p:timing>
+    <p:tnLst>
+      <p:par>
+        <p:cTn id="1" dur="indefinite" restart="never" nodeType="tmRoot"/>
+      </p:par>
+    </p:tnLst>
+  </p:timing>
+</p:sld>
+</file>
+
+<file path=ppt/slides/slide16.xml><?xml version="1.0" encoding="utf-8"?>
+<p:sld xmlns:a="http://schemas.openxmlformats.org/drawingml/2006/main" xmlns:r="http://schemas.openxmlformats.org/officeDocument/2006/relationships" xmlns:p="http://schemas.openxmlformats.org/presentationml/2006/main">
+  <p:cSld>
+    <p:spTree>
+      <p:nvGrpSpPr>
+        <p:cNvPr id="1" name=""/>
+        <p:cNvGrpSpPr/>
+        <p:nvPr/>
+      </p:nvGrpSpPr>
+      <p:grpSpPr>
+        <a:xfrm>
+          <a:off x="0" y="0"/>
+          <a:ext cx="0" cy="0"/>
+          <a:chOff x="0" y="0"/>
+          <a:chExt cx="0" cy="0"/>
+        </a:xfrm>
+      </p:grpSpPr>
+      <p:sp>
+        <p:nvSpPr>
+          <p:cNvPr id="6" name="Titre 5"/>
+          <p:cNvSpPr>
+            <a:spLocks noGrp="1"/>
+          </p:cNvSpPr>
+          <p:nvPr>
+            <p:ph type="title"/>
+          </p:nvPr>
+        </p:nvSpPr>
+        <p:spPr>
+          <a:xfrm>
+            <a:off x="901700" y="165586"/>
+            <a:ext cx="7570228" cy="890858"/>
+          </a:xfrm>
+        </p:spPr>
+        <p:txBody>
+          <a:bodyPr/>
+          <a:lstStyle/>
+          <a:p>
+            <a:r>
+              <a:rPr lang="fr-CH" dirty="0" smtClean="0"/>
+              <a:t>Diagramme de communication</a:t>
+            </a:r>
+            <a:endParaRPr lang="fr-CH" dirty="0"/>
+          </a:p>
+        </p:txBody>
+      </p:sp>
+      <p:sp>
+        <p:nvSpPr>
+          <p:cNvPr id="4" name="Espace réservé du numéro de diapositive 3"/>
+          <p:cNvSpPr>
+            <a:spLocks noGrp="1"/>
+          </p:cNvSpPr>
+          <p:nvPr>
+            <p:ph type="sldNum" sz="quarter" idx="12"/>
+          </p:nvPr>
+        </p:nvSpPr>
+        <p:spPr/>
+        <p:txBody>
+          <a:bodyPr/>
+          <a:lstStyle/>
+          <a:p>
+            <a:fld id="{C214D402-94C6-4E56-8BC2-0A53FF3B7787}" type="slidenum">
+              <a:rPr lang="fr-CH" smtClean="0"/>
+              <a:pPr/>
+              <a:t>15</a:t>
+            </a:fld>
+            <a:endParaRPr lang="fr-CH" dirty="0"/>
+          </a:p>
+        </p:txBody>
+      </p:sp>
+      <p:pic>
+        <p:nvPicPr>
+          <p:cNvPr id="3" name="Espace réservé du contenu 2"/>
+          <p:cNvPicPr>
+            <a:picLocks noGrp="1" noChangeAspect="1"/>
+          </p:cNvPicPr>
+          <p:nvPr>
+            <p:ph idx="1"/>
+          </p:nvPr>
+        </p:nvPicPr>
+        <p:blipFill>
+          <a:blip r:embed="rId2">
+            <a:extLst>
+              <a:ext uri="{28A0092B-C50C-407E-A947-70E740481C1C}">
+                <a14:useLocalDpi xmlns:a14="http://schemas.microsoft.com/office/drawing/2010/main" val="0"/>
+              </a:ext>
+            </a:extLst>
+          </a:blip>
+          <a:stretch>
+            <a:fillRect/>
+          </a:stretch>
+        </p:blipFill>
+        <p:spPr>
+          <a:xfrm>
+            <a:off x="0" y="1369685"/>
+            <a:ext cx="9144000" cy="4435865"/>
+          </a:xfrm>
+        </p:spPr>
+      </p:pic>
+    </p:spTree>
+    <p:extLst>
+      <p:ext uri="{BB962C8B-B14F-4D97-AF65-F5344CB8AC3E}">
+        <p14:creationId xmlns:p14="http://schemas.microsoft.com/office/powerpoint/2010/main" val="4201131323"/>
+      </p:ext>
+    </p:extLst>
+  </p:cSld>
+  <p:clrMapOvr>
+    <a:masterClrMapping/>
+  </p:clrMapOvr>
+  <mc:AlternateContent xmlns:mc="http://schemas.openxmlformats.org/markup-compatibility/2006" xmlns:p14="http://schemas.microsoft.com/office/powerpoint/2010/main">
+    <mc:Choice Requires="p14">
+      <p:transition spd="slow" p14:dur="800">
+        <p14:flythrough/>
+      </p:transition>
+    </mc:Choice>
+    <mc:Fallback xmlns="">
+      <p:transition spd="slow">
+        <p:fade/>
+      </p:transition>
+    </mc:Fallback>
+  </mc:AlternateContent>
+  <p:timing>
+    <p:tnLst>
+      <p:par>
+        <p:cTn id="1" dur="indefinite" restart="never" nodeType="tmRoot"/>
+      </p:par>
+    </p:tnLst>
+  </p:timing>
+</p:sld>
+</file>
+
+<file path=ppt/slides/slide17.xml><?xml version="1.0" encoding="utf-8"?>
+<p:sld xmlns:a="http://schemas.openxmlformats.org/drawingml/2006/main" xmlns:r="http://schemas.openxmlformats.org/officeDocument/2006/relationships" xmlns:p="http://schemas.openxmlformats.org/presentationml/2006/main">
+  <p:cSld>
+    <p:spTree>
+      <p:nvGrpSpPr>
+        <p:cNvPr id="1" name=""/>
+        <p:cNvGrpSpPr/>
+        <p:nvPr/>
+      </p:nvGrpSpPr>
+      <p:grpSpPr>
+        <a:xfrm>
+          <a:off x="0" y="0"/>
+          <a:ext cx="0" cy="0"/>
+          <a:chOff x="0" y="0"/>
+          <a:chExt cx="0" cy="0"/>
+        </a:xfrm>
+      </p:grpSpPr>
+      <p:sp>
+        <p:nvSpPr>
+          <p:cNvPr id="5" name="Titre 4"/>
+          <p:cNvSpPr>
+            <a:spLocks noGrp="1"/>
+          </p:cNvSpPr>
+          <p:nvPr>
+            <p:ph type="title"/>
+          </p:nvPr>
+        </p:nvSpPr>
+        <p:spPr/>
+        <p:txBody>
+          <a:bodyPr/>
+          <a:lstStyle/>
+          <a:p>
+            <a:r>
+              <a:rPr lang="fr-CH" dirty="0" smtClean="0"/>
+              <a:t>Prototype</a:t>
+            </a:r>
+            <a:endParaRPr lang="fr-CH" dirty="0"/>
+          </a:p>
+        </p:txBody>
+      </p:sp>
+      <p:sp>
+        <p:nvSpPr>
+          <p:cNvPr id="6" name="Espace réservé du contenu 5"/>
+          <p:cNvSpPr>
+            <a:spLocks noGrp="1"/>
+          </p:cNvSpPr>
+          <p:nvPr>
+            <p:ph idx="1"/>
+          </p:nvPr>
+        </p:nvSpPr>
+        <p:spPr/>
+        <p:txBody>
+          <a:bodyPr/>
+          <a:lstStyle/>
+          <a:p>
+            <a:endParaRPr lang="fr-CH"/>
+          </a:p>
+        </p:txBody>
+      </p:sp>
+      <p:sp>
+        <p:nvSpPr>
+          <p:cNvPr id="4" name="Espace réservé du numéro de diapositive 3"/>
+          <p:cNvSpPr>
+            <a:spLocks noGrp="1"/>
+          </p:cNvSpPr>
+          <p:nvPr>
+            <p:ph type="sldNum" sz="quarter" idx="10"/>
+          </p:nvPr>
+        </p:nvSpPr>
+        <p:spPr/>
+        <p:txBody>
+          <a:bodyPr/>
+          <a:lstStyle/>
+          <a:p>
+            <a:fld id="{C214D402-94C6-4E56-8BC2-0A53FF3B7787}" type="slidenum">
+              <a:rPr lang="fr-CH" smtClean="0"/>
+              <a:pPr/>
+              <a:t>16</a:t>
+            </a:fld>
+            <a:endParaRPr lang="fr-CH" dirty="0"/>
+          </a:p>
+        </p:txBody>
+      </p:sp>
+    </p:spTree>
+    <p:extLst>
+      <p:ext uri="{BB962C8B-B14F-4D97-AF65-F5344CB8AC3E}">
+        <p14:creationId xmlns:p14="http://schemas.microsoft.com/office/powerpoint/2010/main" val="2311194950"/>
+      </p:ext>
+    </p:extLst>
+  </p:cSld>
+  <p:clrMapOvr>
+    <a:masterClrMapping/>
+  </p:clrMapOvr>
+  <mc:AlternateContent xmlns:mc="http://schemas.openxmlformats.org/markup-compatibility/2006" xmlns:p14="http://schemas.microsoft.com/office/powerpoint/2010/main">
+    <mc:Choice Requires="p14">
+      <p:transition spd="slow" p14:dur="800">
+        <p14:flythrough/>
+      </p:transition>
+    </mc:Choice>
+    <mc:Fallback xmlns="">
+      <p:transition spd="slow">
+        <p:fade/>
+      </p:transition>
+    </mc:Fallback>
+  </mc:AlternateContent>
+  <p:timing>
+    <p:tnLst>
+      <p:par>
+        <p:cTn id="1" dur="indefinite" restart="never" nodeType="tmRoot"/>
+      </p:par>
+    </p:tnLst>
+  </p:timing>
+</p:sld>
+</file>
+
+<file path=ppt/slides/slide18.xml><?xml version="1.0" encoding="utf-8"?>
+<p:sld xmlns:a="http://schemas.openxmlformats.org/drawingml/2006/main" xmlns:r="http://schemas.openxmlformats.org/officeDocument/2006/relationships" xmlns:p="http://schemas.openxmlformats.org/presentationml/2006/main">
+  <p:cSld>
+    <p:spTree>
+      <p:nvGrpSpPr>
+        <p:cNvPr id="1" name=""/>
+        <p:cNvGrpSpPr/>
+        <p:nvPr/>
+      </p:nvGrpSpPr>
+      <p:grpSpPr>
+        <a:xfrm>
+          <a:off x="0" y="0"/>
+          <a:ext cx="0" cy="0"/>
+          <a:chOff x="0" y="0"/>
+          <a:chExt cx="0" cy="0"/>
+        </a:xfrm>
+      </p:grpSpPr>
+      <p:sp>
+        <p:nvSpPr>
+          <p:cNvPr id="2" name="Titre 1"/>
+          <p:cNvSpPr>
+            <a:spLocks noGrp="1"/>
+          </p:cNvSpPr>
+          <p:nvPr>
+            <p:ph type="title"/>
+          </p:nvPr>
+        </p:nvSpPr>
+        <p:spPr/>
+        <p:txBody>
+          <a:bodyPr/>
+          <a:lstStyle/>
+          <a:p>
+            <a:r>
+              <a:rPr lang="fr-CH" dirty="0" smtClean="0"/>
+              <a:t>Poster</a:t>
+            </a:r>
+            <a:endParaRPr lang="fr-CH" dirty="0"/>
+          </a:p>
+        </p:txBody>
+      </p:sp>
+      <p:sp>
+        <p:nvSpPr>
+          <p:cNvPr id="3" name="Espace réservé du contenu 2"/>
+          <p:cNvSpPr>
+            <a:spLocks noGrp="1"/>
+          </p:cNvSpPr>
+          <p:nvPr>
+            <p:ph idx="1"/>
+          </p:nvPr>
+        </p:nvSpPr>
+        <p:spPr/>
+        <p:txBody>
+          <a:bodyPr/>
+          <a:lstStyle/>
+          <a:p>
+            <a:endParaRPr lang="fr-CH" dirty="0"/>
+          </a:p>
+        </p:txBody>
+      </p:sp>
+      <p:sp>
+        <p:nvSpPr>
+          <p:cNvPr id="4" name="Espace réservé du numéro de diapositive 3"/>
+          <p:cNvSpPr>
+            <a:spLocks noGrp="1"/>
+          </p:cNvSpPr>
+          <p:nvPr>
+            <p:ph type="sldNum" sz="quarter" idx="10"/>
+          </p:nvPr>
+        </p:nvSpPr>
+        <p:spPr/>
+        <p:txBody>
+          <a:bodyPr/>
+          <a:lstStyle/>
+          <a:p>
+            <a:fld id="{C214D402-94C6-4E56-8BC2-0A53FF3B7787}" type="slidenum">
+              <a:rPr lang="fr-CH" smtClean="0"/>
+              <a:pPr/>
+              <a:t>17</a:t>
+            </a:fld>
+            <a:endParaRPr lang="fr-CH" dirty="0"/>
+          </a:p>
+        </p:txBody>
+      </p:sp>
+    </p:spTree>
+    <p:extLst>
+      <p:ext uri="{BB962C8B-B14F-4D97-AF65-F5344CB8AC3E}">
+        <p14:creationId xmlns:p14="http://schemas.microsoft.com/office/powerpoint/2010/main" val="61403989"/>
+      </p:ext>
+    </p:extLst>
+  </p:cSld>
+  <p:clrMapOvr>
+    <a:masterClrMapping/>
+  </p:clrMapOvr>
+  <mc:AlternateContent xmlns:mc="http://schemas.openxmlformats.org/markup-compatibility/2006" xmlns:p14="http://schemas.microsoft.com/office/powerpoint/2010/main">
+    <mc:Choice Requires="p14">
+      <p:transition spd="slow" p14:dur="800">
+        <p14:flythrough/>
       </p:transition>
     </mc:Choice>
     <mc:Fallback xmlns="">
@@ -3452,7 +4738,7 @@
         <p:spPr/>
         <p:txBody>
           <a:bodyPr>
-            <a:normAutofit fontScale="92500" lnSpcReduction="20000"/>
+            <a:normAutofit fontScale="85000" lnSpcReduction="20000"/>
           </a:bodyPr>
           <a:lstStyle/>
           <a:p>
@@ -3476,11 +4762,7 @@
             <a:pPr lvl="1"/>
             <a:r>
               <a:rPr lang="fr-CH" dirty="0" smtClean="0"/>
-              <a:t>Cas </a:t>
-            </a:r>
-            <a:r>
-              <a:rPr lang="fr-CH" dirty="0" smtClean="0"/>
-              <a:t>d’utilisation</a:t>
+              <a:t>Cas d’utilisation</a:t>
             </a:r>
           </a:p>
           <a:p>
@@ -3489,7 +4771,6 @@
               <a:rPr lang="fr-CH" dirty="0" smtClean="0"/>
               <a:t>Maquette</a:t>
             </a:r>
-            <a:endParaRPr lang="fr-CH" dirty="0" smtClean="0"/>
           </a:p>
           <a:p>
             <a:pPr marL="457200" indent="-457200">
@@ -3529,13 +4810,6 @@
             <a:pPr lvl="1"/>
             <a:r>
               <a:rPr lang="fr-CH" dirty="0" smtClean="0"/>
-              <a:t>Diagramme séquence système</a:t>
-            </a:r>
-          </a:p>
-          <a:p>
-            <a:pPr lvl="1"/>
-            <a:r>
-              <a:rPr lang="fr-CH" dirty="0" smtClean="0"/>
               <a:t>Diagramme de classe</a:t>
             </a:r>
           </a:p>
@@ -3549,10 +4823,20 @@
           <a:p>
             <a:pPr lvl="1"/>
             <a:r>
+              <a:rPr lang="fr-CH" dirty="0"/>
+              <a:t>Diagramme </a:t>
+            </a:r>
+            <a:r>
+              <a:rPr lang="fr-CH" dirty="0" smtClean="0"/>
+              <a:t>de séquence système</a:t>
+            </a:r>
+          </a:p>
+          <a:p>
+            <a:pPr lvl="1"/>
+            <a:r>
               <a:rPr lang="fr-CH" dirty="0" smtClean="0"/>
               <a:t>Diagramme de séquence détaillés</a:t>
             </a:r>
-            <a:endParaRPr lang="fr-CH" dirty="0" smtClean="0"/>
           </a:p>
           <a:p>
             <a:pPr marL="457200" indent="-457200">
@@ -3858,7 +5142,7 @@
         </p:blipFill>
         <p:spPr>
           <a:xfrm>
-            <a:off x="1910161" y="1506229"/>
+            <a:off x="386161" y="1506230"/>
             <a:ext cx="5658640" cy="4410691"/>
           </a:xfrm>
         </p:spPr>
@@ -3873,18 +5157,25 @@
   <p:clrMapOvr>
     <a:masterClrMapping/>
   </p:clrMapOvr>
-  <mc:AlternateContent xmlns:mc="http://schemas.openxmlformats.org/markup-compatibility/2006">
-    <mc:Choice xmlns:p14="http://schemas.microsoft.com/office/powerpoint/2010/main" Requires="p14">
+  <mc:AlternateContent xmlns:mc="http://schemas.openxmlformats.org/markup-compatibility/2006" xmlns:p14="http://schemas.microsoft.com/office/powerpoint/2010/main">
+    <mc:Choice Requires="p14">
       <p:transition spd="slow" p14:dur="800">
         <p14:flythrough/>
       </p:transition>
     </mc:Choice>
-    <mc:Fallback>
+    <mc:Fallback xmlns="">
       <p:transition spd="slow">
         <p:fade/>
       </p:transition>
     </mc:Fallback>
   </mc:AlternateContent>
+  <p:timing>
+    <p:tnLst>
+      <p:par>
+        <p:cTn id="1" dur="indefinite" restart="never" nodeType="tmRoot"/>
+      </p:par>
+    </p:tnLst>
+  </p:timing>
 </p:sld>
 </file>
 
@@ -3905,29 +5196,6 @@
           <a:chExt cx="0" cy="0"/>
         </a:xfrm>
       </p:grpSpPr>
-      <p:sp>
-        <p:nvSpPr>
-          <p:cNvPr id="2" name="Titre 1"/>
-          <p:cNvSpPr>
-            <a:spLocks noGrp="1"/>
-          </p:cNvSpPr>
-          <p:nvPr>
-            <p:ph type="title"/>
-          </p:nvPr>
-        </p:nvSpPr>
-        <p:spPr/>
-        <p:txBody>
-          <a:bodyPr/>
-          <a:lstStyle/>
-          <a:p>
-            <a:r>
-              <a:rPr lang="fr-CH" dirty="0" smtClean="0"/>
-              <a:t>Maquette</a:t>
-            </a:r>
-            <a:endParaRPr lang="fr-CH" dirty="0"/>
-          </a:p>
-        </p:txBody>
-      </p:sp>
       <p:pic>
         <p:nvPicPr>
           <p:cNvPr id="5" name="Espace réservé du contenu 4"/>
@@ -3952,8 +5220,8 @@
         </p:blipFill>
         <p:spPr>
           <a:xfrm>
-            <a:off x="1203325" y="1417067"/>
-            <a:ext cx="7072313" cy="4589016"/>
+            <a:off x="0" y="170753"/>
+            <a:ext cx="9166756" cy="5948039"/>
           </a:xfrm>
         </p:spPr>
       </p:pic>
@@ -3964,7 +5232,7 @@
             <a:spLocks noGrp="1"/>
           </p:cNvSpPr>
           <p:nvPr>
-            <p:ph type="sldNum" sz="quarter" idx="10"/>
+            <p:ph type="sldNum" sz="quarter" idx="12"/>
           </p:nvPr>
         </p:nvSpPr>
         <p:spPr/>
@@ -3991,18 +5259,555 @@
   <p:clrMapOvr>
     <a:masterClrMapping/>
   </p:clrMapOvr>
-  <mc:AlternateContent xmlns:mc="http://schemas.openxmlformats.org/markup-compatibility/2006">
-    <mc:Choice xmlns:p14="http://schemas.microsoft.com/office/powerpoint/2010/main" Requires="p14">
+  <mc:AlternateContent xmlns:mc="http://schemas.openxmlformats.org/markup-compatibility/2006" xmlns:p14="http://schemas.microsoft.com/office/powerpoint/2010/main">
+    <mc:Choice Requires="p14">
       <p:transition spd="slow" p14:dur="800">
         <p14:flythrough/>
       </p:transition>
     </mc:Choice>
-    <mc:Fallback>
+    <mc:Fallback xmlns="">
       <p:transition spd="slow">
         <p:fade/>
       </p:transition>
     </mc:Fallback>
   </mc:AlternateContent>
+  <p:timing>
+    <p:tnLst>
+      <p:par>
+        <p:cTn id="1" dur="indefinite" restart="never" nodeType="tmRoot"/>
+      </p:par>
+    </p:tnLst>
+  </p:timing>
+</p:sld>
+</file>
+
+<file path=ppt/slides/slide6.xml><?xml version="1.0" encoding="utf-8"?>
+<p:sld xmlns:a="http://schemas.openxmlformats.org/drawingml/2006/main" xmlns:r="http://schemas.openxmlformats.org/officeDocument/2006/relationships" xmlns:p="http://schemas.openxmlformats.org/presentationml/2006/main">
+  <p:cSld>
+    <p:spTree>
+      <p:nvGrpSpPr>
+        <p:cNvPr id="1" name=""/>
+        <p:cNvGrpSpPr/>
+        <p:nvPr/>
+      </p:nvGrpSpPr>
+      <p:grpSpPr>
+        <a:xfrm>
+          <a:off x="0" y="0"/>
+          <a:ext cx="0" cy="0"/>
+          <a:chOff x="0" y="0"/>
+          <a:chExt cx="0" cy="0"/>
+        </a:xfrm>
+      </p:grpSpPr>
+      <p:sp>
+        <p:nvSpPr>
+          <p:cNvPr id="2" name="Titre 1"/>
+          <p:cNvSpPr>
+            <a:spLocks noGrp="1"/>
+          </p:cNvSpPr>
+          <p:nvPr>
+            <p:ph type="title"/>
+          </p:nvPr>
+        </p:nvSpPr>
+        <p:spPr/>
+        <p:txBody>
+          <a:bodyPr/>
+          <a:lstStyle/>
+          <a:p>
+            <a:r>
+              <a:rPr lang="fr-CH" dirty="0" smtClean="0"/>
+              <a:t>Distribution des rôles</a:t>
+            </a:r>
+            <a:endParaRPr lang="fr-CH" dirty="0"/>
+          </a:p>
+        </p:txBody>
+      </p:sp>
+      <p:sp>
+        <p:nvSpPr>
+          <p:cNvPr id="5" name="Espace réservé du contenu 4"/>
+          <p:cNvSpPr>
+            <a:spLocks noGrp="1"/>
+          </p:cNvSpPr>
+          <p:nvPr>
+            <p:ph idx="1"/>
+          </p:nvPr>
+        </p:nvSpPr>
+        <p:spPr>
+          <a:xfrm>
+            <a:off x="400351" y="1810521"/>
+            <a:ext cx="7221989" cy="4598271"/>
+          </a:xfrm>
+        </p:spPr>
+        <p:txBody>
+          <a:bodyPr>
+            <a:normAutofit/>
+          </a:bodyPr>
+          <a:lstStyle/>
+          <a:p>
+            <a:r>
+              <a:rPr lang="fr-CH" sz="1800" b="0" dirty="0" smtClean="0"/>
+              <a:t>Chef de projet: </a:t>
+            </a:r>
+            <a:r>
+              <a:rPr lang="fr-CH" sz="1800" dirty="0" smtClean="0"/>
+              <a:t>Nicolas Gonin</a:t>
+            </a:r>
+          </a:p>
+          <a:p>
+            <a:r>
+              <a:rPr lang="fr-CH" sz="1800" b="0" dirty="0"/>
+              <a:t>Responsable métier: </a:t>
+            </a:r>
+            <a:r>
+              <a:rPr lang="fr-CH" sz="1800" dirty="0"/>
+              <a:t>Nicolas </a:t>
+            </a:r>
+            <a:r>
+              <a:rPr lang="fr-CH" sz="1800" dirty="0" smtClean="0"/>
+              <a:t>Gonin</a:t>
+            </a:r>
+          </a:p>
+          <a:p>
+            <a:r>
+              <a:rPr lang="fr-CH" sz="1800" b="0" dirty="0" smtClean="0"/>
+              <a:t>Responsable de l’intégration: </a:t>
+            </a:r>
+            <a:r>
+              <a:rPr lang="fr-CH" sz="1800" dirty="0" smtClean="0"/>
+              <a:t>Kevin </a:t>
+            </a:r>
+            <a:r>
+              <a:rPr lang="fr-CH" sz="1800" dirty="0" err="1" smtClean="0"/>
+              <a:t>Vulliemin</a:t>
+            </a:r>
+            <a:endParaRPr lang="fr-CH" sz="1800" dirty="0" smtClean="0"/>
+          </a:p>
+          <a:p>
+            <a:r>
+              <a:rPr lang="fr-CH" sz="1800" b="0" dirty="0" smtClean="0"/>
+              <a:t>Responsable du Design général: </a:t>
+            </a:r>
+            <a:r>
+              <a:rPr lang="fr-CH" sz="1800" dirty="0" smtClean="0"/>
+              <a:t>Kevin </a:t>
+            </a:r>
+            <a:r>
+              <a:rPr lang="fr-CH" sz="1800" dirty="0" err="1" smtClean="0"/>
+              <a:t>Vulliemin</a:t>
+            </a:r>
+            <a:endParaRPr lang="fr-CH" sz="1800" dirty="0" smtClean="0"/>
+          </a:p>
+          <a:p>
+            <a:r>
+              <a:rPr lang="fr-CH" sz="1800" b="0" dirty="0" smtClean="0"/>
+              <a:t>Responsable module graphique: </a:t>
+            </a:r>
+            <a:r>
+              <a:rPr lang="fr-CH" sz="1800" dirty="0" smtClean="0"/>
+              <a:t>Matthieu </a:t>
+            </a:r>
+            <a:r>
+              <a:rPr lang="fr-CH" sz="1800" dirty="0" err="1" smtClean="0"/>
+              <a:t>Bandelier</a:t>
+            </a:r>
+            <a:endParaRPr lang="fr-CH" sz="1800" dirty="0" smtClean="0"/>
+          </a:p>
+          <a:p>
+            <a:r>
+              <a:rPr lang="fr-CH" sz="1800" b="0" dirty="0"/>
+              <a:t>Responsable des spécifications: </a:t>
+            </a:r>
+            <a:r>
+              <a:rPr lang="fr-CH" sz="1800" dirty="0"/>
+              <a:t>Matthieu </a:t>
+            </a:r>
+            <a:r>
+              <a:rPr lang="fr-CH" sz="1800" dirty="0" err="1" smtClean="0"/>
+              <a:t>Bandelier</a:t>
+            </a:r>
+            <a:endParaRPr lang="fr-CH" sz="1800" dirty="0"/>
+          </a:p>
+          <a:p>
+            <a:r>
+              <a:rPr lang="fr-CH" sz="1800" b="0" dirty="0" smtClean="0"/>
+              <a:t>Responsable interface graphique: </a:t>
+            </a:r>
+            <a:r>
+              <a:rPr lang="fr-CH" sz="1800" dirty="0" smtClean="0"/>
+              <a:t>Bastien </a:t>
+            </a:r>
+            <a:r>
+              <a:rPr lang="fr-CH" sz="1800" dirty="0" err="1" smtClean="0"/>
+              <a:t>Burri</a:t>
+            </a:r>
+            <a:endParaRPr lang="fr-CH" sz="1800" dirty="0" smtClean="0"/>
+          </a:p>
+        </p:txBody>
+      </p:sp>
+      <p:sp>
+        <p:nvSpPr>
+          <p:cNvPr id="4" name="Espace réservé du numéro de diapositive 3"/>
+          <p:cNvSpPr>
+            <a:spLocks noGrp="1"/>
+          </p:cNvSpPr>
+          <p:nvPr>
+            <p:ph type="sldNum" sz="quarter" idx="10"/>
+          </p:nvPr>
+        </p:nvSpPr>
+        <p:spPr/>
+        <p:txBody>
+          <a:bodyPr/>
+          <a:lstStyle/>
+          <a:p>
+            <a:fld id="{C214D402-94C6-4E56-8BC2-0A53FF3B7787}" type="slidenum">
+              <a:rPr lang="fr-CH" smtClean="0"/>
+              <a:t>5</a:t>
+            </a:fld>
+            <a:endParaRPr lang="fr-CH"/>
+          </a:p>
+        </p:txBody>
+      </p:sp>
+    </p:spTree>
+    <p:extLst>
+      <p:ext uri="{BB962C8B-B14F-4D97-AF65-F5344CB8AC3E}">
+        <p14:creationId xmlns:p14="http://schemas.microsoft.com/office/powerpoint/2010/main" val="3665826911"/>
+      </p:ext>
+    </p:extLst>
+  </p:cSld>
+  <p:clrMapOvr>
+    <a:masterClrMapping/>
+  </p:clrMapOvr>
+  <mc:AlternateContent xmlns:mc="http://schemas.openxmlformats.org/markup-compatibility/2006" xmlns:p14="http://schemas.microsoft.com/office/powerpoint/2010/main">
+    <mc:Choice Requires="p14">
+      <p:transition spd="slow" p14:dur="800">
+        <p14:flythrough/>
+      </p:transition>
+    </mc:Choice>
+    <mc:Fallback xmlns="">
+      <p:transition spd="slow">
+        <p:fade/>
+      </p:transition>
+    </mc:Fallback>
+  </mc:AlternateContent>
+  <p:timing>
+    <p:tnLst>
+      <p:par>
+        <p:cTn id="1" dur="indefinite" restart="never" nodeType="tmRoot"/>
+      </p:par>
+    </p:tnLst>
+  </p:timing>
+</p:sld>
+</file>
+
+<file path=ppt/slides/slide7.xml><?xml version="1.0" encoding="utf-8"?>
+<p:sld xmlns:a="http://schemas.openxmlformats.org/drawingml/2006/main" xmlns:r="http://schemas.openxmlformats.org/officeDocument/2006/relationships" xmlns:p="http://schemas.openxmlformats.org/presentationml/2006/main">
+  <p:cSld>
+    <p:spTree>
+      <p:nvGrpSpPr>
+        <p:cNvPr id="1" name=""/>
+        <p:cNvGrpSpPr/>
+        <p:nvPr/>
+      </p:nvGrpSpPr>
+      <p:grpSpPr>
+        <a:xfrm>
+          <a:off x="0" y="0"/>
+          <a:ext cx="0" cy="0"/>
+          <a:chOff x="0" y="0"/>
+          <a:chExt cx="0" cy="0"/>
+        </a:xfrm>
+      </p:grpSpPr>
+      <p:sp>
+        <p:nvSpPr>
+          <p:cNvPr id="5" name="Titre 4"/>
+          <p:cNvSpPr>
+            <a:spLocks noGrp="1"/>
+          </p:cNvSpPr>
+          <p:nvPr>
+            <p:ph type="title"/>
+          </p:nvPr>
+        </p:nvSpPr>
+        <p:spPr/>
+        <p:txBody>
+          <a:bodyPr/>
+          <a:lstStyle/>
+          <a:p>
+            <a:r>
+              <a:rPr lang="fr-CH" dirty="0" smtClean="0"/>
+              <a:t>Planning</a:t>
+            </a:r>
+            <a:endParaRPr lang="fr-CH" dirty="0"/>
+          </a:p>
+        </p:txBody>
+      </p:sp>
+      <p:sp>
+        <p:nvSpPr>
+          <p:cNvPr id="6" name="Espace réservé du contenu 5"/>
+          <p:cNvSpPr>
+            <a:spLocks noGrp="1"/>
+          </p:cNvSpPr>
+          <p:nvPr>
+            <p:ph idx="1"/>
+          </p:nvPr>
+        </p:nvSpPr>
+        <p:spPr/>
+        <p:txBody>
+          <a:bodyPr/>
+          <a:lstStyle/>
+          <a:p>
+            <a:endParaRPr lang="fr-CH"/>
+          </a:p>
+        </p:txBody>
+      </p:sp>
+      <p:sp>
+        <p:nvSpPr>
+          <p:cNvPr id="4" name="Espace réservé du numéro de diapositive 3"/>
+          <p:cNvSpPr>
+            <a:spLocks noGrp="1"/>
+          </p:cNvSpPr>
+          <p:nvPr>
+            <p:ph type="sldNum" sz="quarter" idx="10"/>
+          </p:nvPr>
+        </p:nvSpPr>
+        <p:spPr/>
+        <p:txBody>
+          <a:bodyPr/>
+          <a:lstStyle/>
+          <a:p>
+            <a:fld id="{C214D402-94C6-4E56-8BC2-0A53FF3B7787}" type="slidenum">
+              <a:rPr lang="fr-CH" smtClean="0"/>
+              <a:pPr/>
+              <a:t>6</a:t>
+            </a:fld>
+            <a:endParaRPr lang="fr-CH" dirty="0"/>
+          </a:p>
+        </p:txBody>
+      </p:sp>
+    </p:spTree>
+    <p:extLst>
+      <p:ext uri="{BB962C8B-B14F-4D97-AF65-F5344CB8AC3E}">
+        <p14:creationId xmlns:p14="http://schemas.microsoft.com/office/powerpoint/2010/main" val="3106220760"/>
+      </p:ext>
+    </p:extLst>
+  </p:cSld>
+  <p:clrMapOvr>
+    <a:masterClrMapping/>
+  </p:clrMapOvr>
+  <mc:AlternateContent xmlns:mc="http://schemas.openxmlformats.org/markup-compatibility/2006" xmlns:p14="http://schemas.microsoft.com/office/powerpoint/2010/main">
+    <mc:Choice Requires="p14">
+      <p:transition spd="slow" p14:dur="800">
+        <p14:flythrough/>
+      </p:transition>
+    </mc:Choice>
+    <mc:Fallback xmlns="">
+      <p:transition spd="slow">
+        <p:fade/>
+      </p:transition>
+    </mc:Fallback>
+  </mc:AlternateContent>
+  <p:timing>
+    <p:tnLst>
+      <p:par>
+        <p:cTn id="1" dur="indefinite" restart="never" nodeType="tmRoot"/>
+      </p:par>
+    </p:tnLst>
+  </p:timing>
+</p:sld>
+</file>
+
+<file path=ppt/slides/slide8.xml><?xml version="1.0" encoding="utf-8"?>
+<p:sld xmlns:a="http://schemas.openxmlformats.org/drawingml/2006/main" xmlns:r="http://schemas.openxmlformats.org/officeDocument/2006/relationships" xmlns:p="http://schemas.openxmlformats.org/presentationml/2006/main">
+  <p:cSld>
+    <p:spTree>
+      <p:nvGrpSpPr>
+        <p:cNvPr id="1" name=""/>
+        <p:cNvGrpSpPr/>
+        <p:nvPr/>
+      </p:nvGrpSpPr>
+      <p:grpSpPr>
+        <a:xfrm>
+          <a:off x="0" y="0"/>
+          <a:ext cx="0" cy="0"/>
+          <a:chOff x="0" y="0"/>
+          <a:chExt cx="0" cy="0"/>
+        </a:xfrm>
+      </p:grpSpPr>
+      <p:sp>
+        <p:nvSpPr>
+          <p:cNvPr id="2" name="Titre 1"/>
+          <p:cNvSpPr>
+            <a:spLocks noGrp="1"/>
+          </p:cNvSpPr>
+          <p:nvPr>
+            <p:ph type="title"/>
+          </p:nvPr>
+        </p:nvSpPr>
+        <p:spPr/>
+        <p:txBody>
+          <a:bodyPr/>
+          <a:lstStyle/>
+          <a:p>
+            <a:r>
+              <a:rPr lang="fr-CH" dirty="0" smtClean="0"/>
+              <a:t>Diagramme de classe</a:t>
+            </a:r>
+            <a:endParaRPr lang="fr-CH" dirty="0"/>
+          </a:p>
+        </p:txBody>
+      </p:sp>
+      <p:sp>
+        <p:nvSpPr>
+          <p:cNvPr id="4" name="Espace réservé du numéro de diapositive 3"/>
+          <p:cNvSpPr>
+            <a:spLocks noGrp="1"/>
+          </p:cNvSpPr>
+          <p:nvPr>
+            <p:ph type="sldNum" sz="quarter" idx="10"/>
+          </p:nvPr>
+        </p:nvSpPr>
+        <p:spPr/>
+        <p:txBody>
+          <a:bodyPr/>
+          <a:lstStyle/>
+          <a:p>
+            <a:fld id="{C214D402-94C6-4E56-8BC2-0A53FF3B7787}" type="slidenum">
+              <a:rPr lang="fr-CH" smtClean="0"/>
+              <a:pPr/>
+              <a:t>7</a:t>
+            </a:fld>
+            <a:endParaRPr lang="fr-CH" dirty="0"/>
+          </a:p>
+        </p:txBody>
+      </p:sp>
+    </p:spTree>
+    <p:extLst>
+      <p:ext uri="{BB962C8B-B14F-4D97-AF65-F5344CB8AC3E}">
+        <p14:creationId xmlns:p14="http://schemas.microsoft.com/office/powerpoint/2010/main" val="2965514259"/>
+      </p:ext>
+    </p:extLst>
+  </p:cSld>
+  <p:clrMapOvr>
+    <a:masterClrMapping/>
+  </p:clrMapOvr>
+  <mc:AlternateContent xmlns:mc="http://schemas.openxmlformats.org/markup-compatibility/2006" xmlns:p14="http://schemas.microsoft.com/office/powerpoint/2010/main">
+    <mc:Choice Requires="p14">
+      <p:transition spd="slow" p14:dur="800">
+        <p14:flythrough/>
+      </p:transition>
+    </mc:Choice>
+    <mc:Fallback xmlns="">
+      <p:transition spd="slow">
+        <p:fade/>
+      </p:transition>
+    </mc:Fallback>
+  </mc:AlternateContent>
+  <p:timing>
+    <p:tnLst>
+      <p:par>
+        <p:cTn id="1" dur="indefinite" restart="never" nodeType="tmRoot"/>
+      </p:par>
+    </p:tnLst>
+  </p:timing>
+</p:sld>
+</file>
+
+<file path=ppt/slides/slide9.xml><?xml version="1.0" encoding="utf-8"?>
+<p:sld xmlns:a="http://schemas.openxmlformats.org/drawingml/2006/main" xmlns:r="http://schemas.openxmlformats.org/officeDocument/2006/relationships" xmlns:p="http://schemas.openxmlformats.org/presentationml/2006/main">
+  <p:cSld>
+    <p:spTree>
+      <p:nvGrpSpPr>
+        <p:cNvPr id="1" name=""/>
+        <p:cNvGrpSpPr/>
+        <p:nvPr/>
+      </p:nvGrpSpPr>
+      <p:grpSpPr>
+        <a:xfrm>
+          <a:off x="0" y="0"/>
+          <a:ext cx="0" cy="0"/>
+          <a:chOff x="0" y="0"/>
+          <a:chExt cx="0" cy="0"/>
+        </a:xfrm>
+      </p:grpSpPr>
+      <p:pic>
+        <p:nvPicPr>
+          <p:cNvPr id="6" name="Espace réservé du contenu 5"/>
+          <p:cNvPicPr>
+            <a:picLocks noGrp="1" noChangeAspect="1"/>
+          </p:cNvPicPr>
+          <p:nvPr>
+            <p:ph idx="1"/>
+          </p:nvPr>
+        </p:nvPicPr>
+        <p:blipFill>
+          <a:blip r:embed="rId2">
+            <a:extLst>
+              <a:ext uri="{28A0092B-C50C-407E-A947-70E740481C1C}">
+                <a14:useLocalDpi xmlns:a14="http://schemas.microsoft.com/office/drawing/2010/main" val="0"/>
+              </a:ext>
+            </a:extLst>
+          </a:blip>
+          <a:stretch>
+            <a:fillRect/>
+          </a:stretch>
+        </p:blipFill>
+        <p:spPr>
+          <a:xfrm>
+            <a:off x="0" y="0"/>
+            <a:ext cx="9181380" cy="6054571"/>
+          </a:xfrm>
+        </p:spPr>
+      </p:pic>
+      <p:sp>
+        <p:nvSpPr>
+          <p:cNvPr id="4" name="Espace réservé du numéro de diapositive 3"/>
+          <p:cNvSpPr>
+            <a:spLocks noGrp="1"/>
+          </p:cNvSpPr>
+          <p:nvPr>
+            <p:ph type="sldNum" sz="quarter" idx="12"/>
+          </p:nvPr>
+        </p:nvSpPr>
+        <p:spPr/>
+        <p:txBody>
+          <a:bodyPr/>
+          <a:lstStyle/>
+          <a:p>
+            <a:fld id="{C214D402-94C6-4E56-8BC2-0A53FF3B7787}" type="slidenum">
+              <a:rPr lang="fr-CH" smtClean="0"/>
+              <a:pPr/>
+              <a:t>8</a:t>
+            </a:fld>
+            <a:endParaRPr lang="fr-CH" dirty="0"/>
+          </a:p>
+        </p:txBody>
+      </p:sp>
+    </p:spTree>
+    <p:extLst>
+      <p:ext uri="{BB962C8B-B14F-4D97-AF65-F5344CB8AC3E}">
+        <p14:creationId xmlns:p14="http://schemas.microsoft.com/office/powerpoint/2010/main" val="1522674789"/>
+      </p:ext>
+    </p:extLst>
+  </p:cSld>
+  <p:clrMapOvr>
+    <a:masterClrMapping/>
+  </p:clrMapOvr>
+  <mc:AlternateContent xmlns:mc="http://schemas.openxmlformats.org/markup-compatibility/2006" xmlns:p14="http://schemas.microsoft.com/office/powerpoint/2010/main">
+    <mc:Choice Requires="p14">
+      <p:transition spd="slow" p14:dur="800">
+        <p14:flythrough/>
+      </p:transition>
+    </mc:Choice>
+    <mc:Fallback xmlns="">
+      <p:transition spd="slow">
+        <p:fade/>
+      </p:transition>
+    </mc:Fallback>
+  </mc:AlternateContent>
+  <p:timing>
+    <p:tnLst>
+      <p:par>
+        <p:cTn id="1" dur="indefinite" restart="never" nodeType="tmRoot"/>
+      </p:par>
+    </p:tnLst>
+  </p:timing>
 </p:sld>
 </file>
 

</xml_diff>